<commit_message>
Update some code of the UT
still several cases fail to pass
</commit_message>
<xml_diff>
--- a/doc/test/PositionsLab/PositionsLabFlip.pptx
+++ b/doc/test/PositionsLab/PositionsLabFlip.pptx
@@ -344,7 +344,7 @@
           <a:p>
             <a:fld id="{699DC775-C286-4358-8C92-D7E584E969B3}" type="datetimeFigureOut">
               <a:rPr lang="en-US" smtClean="0"/>
-              <a:t>6/7/2016</a:t>
+              <a:t>9/6/2016</a:t>
             </a:fld>
             <a:endParaRPr lang="en-US"/>
           </a:p>
@@ -512,7 +512,7 @@
           <a:p>
             <a:fld id="{699DC775-C286-4358-8C92-D7E584E969B3}" type="datetimeFigureOut">
               <a:rPr lang="en-US" smtClean="0"/>
-              <a:t>6/7/2016</a:t>
+              <a:t>9/6/2016</a:t>
             </a:fld>
             <a:endParaRPr lang="en-US"/>
           </a:p>
@@ -690,7 +690,7 @@
           <a:p>
             <a:fld id="{699DC775-C286-4358-8C92-D7E584E969B3}" type="datetimeFigureOut">
               <a:rPr lang="en-US" smtClean="0"/>
-              <a:t>6/7/2016</a:t>
+              <a:t>9/6/2016</a:t>
             </a:fld>
             <a:endParaRPr lang="en-US"/>
           </a:p>
@@ -930,7 +930,7 @@
           <a:p>
             <a:fld id="{699DC775-C286-4358-8C92-D7E584E969B3}" type="datetimeFigureOut">
               <a:rPr lang="en-US" smtClean="0"/>
-              <a:t>6/7/2016</a:t>
+              <a:t>9/6/2016</a:t>
             </a:fld>
             <a:endParaRPr lang="en-US"/>
           </a:p>
@@ -1098,7 +1098,7 @@
           <a:p>
             <a:fld id="{699DC775-C286-4358-8C92-D7E584E969B3}" type="datetimeFigureOut">
               <a:rPr lang="en-US" smtClean="0"/>
-              <a:t>6/7/2016</a:t>
+              <a:t>9/6/2016</a:t>
             </a:fld>
             <a:endParaRPr lang="en-US"/>
           </a:p>
@@ -1343,7 +1343,7 @@
           <a:p>
             <a:fld id="{699DC775-C286-4358-8C92-D7E584E969B3}" type="datetimeFigureOut">
               <a:rPr lang="en-US" smtClean="0"/>
-              <a:t>6/7/2016</a:t>
+              <a:t>9/6/2016</a:t>
             </a:fld>
             <a:endParaRPr lang="en-US"/>
           </a:p>
@@ -1628,7 +1628,7 @@
           <a:p>
             <a:fld id="{699DC775-C286-4358-8C92-D7E584E969B3}" type="datetimeFigureOut">
               <a:rPr lang="en-US" smtClean="0"/>
-              <a:t>6/7/2016</a:t>
+              <a:t>9/6/2016</a:t>
             </a:fld>
             <a:endParaRPr lang="en-US"/>
           </a:p>
@@ -2047,7 +2047,7 @@
           <a:p>
             <a:fld id="{699DC775-C286-4358-8C92-D7E584E969B3}" type="datetimeFigureOut">
               <a:rPr lang="en-US" smtClean="0"/>
-              <a:t>6/7/2016</a:t>
+              <a:t>9/6/2016</a:t>
             </a:fld>
             <a:endParaRPr lang="en-US"/>
           </a:p>
@@ -2164,7 +2164,7 @@
           <a:p>
             <a:fld id="{699DC775-C286-4358-8C92-D7E584E969B3}" type="datetimeFigureOut">
               <a:rPr lang="en-US" smtClean="0"/>
-              <a:t>6/7/2016</a:t>
+              <a:t>9/6/2016</a:t>
             </a:fld>
             <a:endParaRPr lang="en-US"/>
           </a:p>
@@ -2259,7 +2259,7 @@
           <a:p>
             <a:fld id="{699DC775-C286-4358-8C92-D7E584E969B3}" type="datetimeFigureOut">
               <a:rPr lang="en-US" smtClean="0"/>
-              <a:t>6/7/2016</a:t>
+              <a:t>9/6/2016</a:t>
             </a:fld>
             <a:endParaRPr lang="en-US"/>
           </a:p>
@@ -2534,7 +2534,7 @@
           <a:p>
             <a:fld id="{699DC775-C286-4358-8C92-D7E584E969B3}" type="datetimeFigureOut">
               <a:rPr lang="en-US" smtClean="0"/>
-              <a:t>6/7/2016</a:t>
+              <a:t>9/6/2016</a:t>
             </a:fld>
             <a:endParaRPr lang="en-US"/>
           </a:p>
@@ -2702,7 +2702,7 @@
           <a:p>
             <a:fld id="{699DC775-C286-4358-8C92-D7E584E969B3}" type="datetimeFigureOut">
               <a:rPr lang="en-US" smtClean="0"/>
-              <a:t>6/7/2016</a:t>
+              <a:t>9/6/2016</a:t>
             </a:fld>
             <a:endParaRPr lang="en-US"/>
           </a:p>
@@ -2954,7 +2954,7 @@
           <a:p>
             <a:fld id="{699DC775-C286-4358-8C92-D7E584E969B3}" type="datetimeFigureOut">
               <a:rPr lang="en-US" smtClean="0"/>
-              <a:t>6/7/2016</a:t>
+              <a:t>9/6/2016</a:t>
             </a:fld>
             <a:endParaRPr lang="en-US"/>
           </a:p>
@@ -3122,7 +3122,7 @@
           <a:p>
             <a:fld id="{699DC775-C286-4358-8C92-D7E584E969B3}" type="datetimeFigureOut">
               <a:rPr lang="en-US" smtClean="0"/>
-              <a:t>6/7/2016</a:t>
+              <a:t>9/6/2016</a:t>
             </a:fld>
             <a:endParaRPr lang="en-US"/>
           </a:p>
@@ -3300,7 +3300,7 @@
           <a:p>
             <a:fld id="{699DC775-C286-4358-8C92-D7E584E969B3}" type="datetimeFigureOut">
               <a:rPr lang="en-US" smtClean="0"/>
-              <a:t>6/7/2016</a:t>
+              <a:t>9/6/2016</a:t>
             </a:fld>
             <a:endParaRPr lang="en-US"/>
           </a:p>
@@ -3548,7 +3548,7 @@
           <a:p>
             <a:fld id="{699DC775-C286-4358-8C92-D7E584E969B3}" type="datetimeFigureOut">
               <a:rPr lang="en-US" smtClean="0"/>
-              <a:t>6/7/2016</a:t>
+              <a:t>9/6/2016</a:t>
             </a:fld>
             <a:endParaRPr lang="en-US"/>
           </a:p>
@@ -3724,7 +3724,7 @@
           <a:p>
             <a:fld id="{699DC775-C286-4358-8C92-D7E584E969B3}" type="datetimeFigureOut">
               <a:rPr lang="en-US" smtClean="0"/>
-              <a:t>6/7/2016</a:t>
+              <a:t>9/6/2016</a:t>
             </a:fld>
             <a:endParaRPr lang="en-US"/>
           </a:p>
@@ -3977,7 +3977,7 @@
           <a:p>
             <a:fld id="{699DC775-C286-4358-8C92-D7E584E969B3}" type="datetimeFigureOut">
               <a:rPr lang="en-US" smtClean="0"/>
-              <a:t>6/7/2016</a:t>
+              <a:t>9/6/2016</a:t>
             </a:fld>
             <a:endParaRPr lang="en-US"/>
           </a:p>
@@ -4270,7 +4270,7 @@
           <a:p>
             <a:fld id="{699DC775-C286-4358-8C92-D7E584E969B3}" type="datetimeFigureOut">
               <a:rPr lang="en-US" smtClean="0"/>
-              <a:t>6/7/2016</a:t>
+              <a:t>9/6/2016</a:t>
             </a:fld>
             <a:endParaRPr lang="en-US"/>
           </a:p>
@@ -4697,7 +4697,7 @@
           <a:p>
             <a:fld id="{699DC775-C286-4358-8C92-D7E584E969B3}" type="datetimeFigureOut">
               <a:rPr lang="en-US" smtClean="0"/>
-              <a:t>6/7/2016</a:t>
+              <a:t>9/6/2016</a:t>
             </a:fld>
             <a:endParaRPr lang="en-US"/>
           </a:p>
@@ -4822,7 +4822,7 @@
           <a:p>
             <a:fld id="{699DC775-C286-4358-8C92-D7E584E969B3}" type="datetimeFigureOut">
               <a:rPr lang="en-US" smtClean="0"/>
-              <a:t>6/7/2016</a:t>
+              <a:t>9/6/2016</a:t>
             </a:fld>
             <a:endParaRPr lang="en-US"/>
           </a:p>
@@ -4925,7 +4925,7 @@
           <a:p>
             <a:fld id="{699DC775-C286-4358-8C92-D7E584E969B3}" type="datetimeFigureOut">
               <a:rPr lang="en-US" smtClean="0"/>
-              <a:t>6/7/2016</a:t>
+              <a:t>9/6/2016</a:t>
             </a:fld>
             <a:endParaRPr lang="en-US"/>
           </a:p>
@@ -5170,7 +5170,7 @@
           <a:p>
             <a:fld id="{699DC775-C286-4358-8C92-D7E584E969B3}" type="datetimeFigureOut">
               <a:rPr lang="en-US" smtClean="0"/>
-              <a:t>6/7/2016</a:t>
+              <a:t>9/6/2016</a:t>
             </a:fld>
             <a:endParaRPr lang="en-US"/>
           </a:p>
@@ -5453,7 +5453,7 @@
           <a:p>
             <a:fld id="{699DC775-C286-4358-8C92-D7E584E969B3}" type="datetimeFigureOut">
               <a:rPr lang="en-US" smtClean="0"/>
-              <a:t>6/7/2016</a:t>
+              <a:t>9/6/2016</a:t>
             </a:fld>
             <a:endParaRPr lang="en-US"/>
           </a:p>
@@ -5713,7 +5713,7 @@
           <a:p>
             <a:fld id="{699DC775-C286-4358-8C92-D7E584E969B3}" type="datetimeFigureOut">
               <a:rPr lang="en-US" smtClean="0"/>
-              <a:t>6/7/2016</a:t>
+              <a:t>9/6/2016</a:t>
             </a:fld>
             <a:endParaRPr lang="en-US"/>
           </a:p>
@@ -5889,7 +5889,7 @@
           <a:p>
             <a:fld id="{699DC775-C286-4358-8C92-D7E584E969B3}" type="datetimeFigureOut">
               <a:rPr lang="en-US" smtClean="0"/>
-              <a:t>6/7/2016</a:t>
+              <a:t>9/6/2016</a:t>
             </a:fld>
             <a:endParaRPr lang="en-US"/>
           </a:p>
@@ -6075,7 +6075,7 @@
           <a:p>
             <a:fld id="{699DC775-C286-4358-8C92-D7E584E969B3}" type="datetimeFigureOut">
               <a:rPr lang="en-US" smtClean="0"/>
-              <a:t>6/7/2016</a:t>
+              <a:t>9/6/2016</a:t>
             </a:fld>
             <a:endParaRPr lang="en-US"/>
           </a:p>
@@ -6360,7 +6360,7 @@
           <a:p>
             <a:fld id="{699DC775-C286-4358-8C92-D7E584E969B3}" type="datetimeFigureOut">
               <a:rPr lang="en-US" smtClean="0"/>
-              <a:t>6/7/2016</a:t>
+              <a:t>9/6/2016</a:t>
             </a:fld>
             <a:endParaRPr lang="en-US"/>
           </a:p>
@@ -6779,7 +6779,7 @@
           <a:p>
             <a:fld id="{699DC775-C286-4358-8C92-D7E584E969B3}" type="datetimeFigureOut">
               <a:rPr lang="en-US" smtClean="0"/>
-              <a:t>6/7/2016</a:t>
+              <a:t>9/6/2016</a:t>
             </a:fld>
             <a:endParaRPr lang="en-US"/>
           </a:p>
@@ -6896,7 +6896,7 @@
           <a:p>
             <a:fld id="{699DC775-C286-4358-8C92-D7E584E969B3}" type="datetimeFigureOut">
               <a:rPr lang="en-US" smtClean="0"/>
-              <a:t>6/7/2016</a:t>
+              <a:t>9/6/2016</a:t>
             </a:fld>
             <a:endParaRPr lang="en-US"/>
           </a:p>
@@ -6991,7 +6991,7 @@
           <a:p>
             <a:fld id="{699DC775-C286-4358-8C92-D7E584E969B3}" type="datetimeFigureOut">
               <a:rPr lang="en-US" smtClean="0"/>
-              <a:t>6/7/2016</a:t>
+              <a:t>9/6/2016</a:t>
             </a:fld>
             <a:endParaRPr lang="en-US"/>
           </a:p>
@@ -7266,7 +7266,7 @@
           <a:p>
             <a:fld id="{699DC775-C286-4358-8C92-D7E584E969B3}" type="datetimeFigureOut">
               <a:rPr lang="en-US" smtClean="0"/>
-              <a:t>6/7/2016</a:t>
+              <a:t>9/6/2016</a:t>
             </a:fld>
             <a:endParaRPr lang="en-US"/>
           </a:p>
@@ -7518,7 +7518,7 @@
           <a:p>
             <a:fld id="{699DC775-C286-4358-8C92-D7E584E969B3}" type="datetimeFigureOut">
               <a:rPr lang="en-US" smtClean="0"/>
-              <a:t>6/7/2016</a:t>
+              <a:t>9/6/2016</a:t>
             </a:fld>
             <a:endParaRPr lang="en-US"/>
           </a:p>
@@ -7729,7 +7729,7 @@
           <a:p>
             <a:fld id="{699DC775-C286-4358-8C92-D7E584E969B3}" type="datetimeFigureOut">
               <a:rPr lang="en-US" smtClean="0"/>
-              <a:t>6/7/2016</a:t>
+              <a:t>9/6/2016</a:t>
             </a:fld>
             <a:endParaRPr lang="en-US"/>
           </a:p>
@@ -8242,7 +8242,7 @@
           <a:p>
             <a:fld id="{699DC775-C286-4358-8C92-D7E584E969B3}" type="datetimeFigureOut">
               <a:rPr lang="en-US" smtClean="0"/>
-              <a:t>6/7/2016</a:t>
+              <a:t>9/6/2016</a:t>
             </a:fld>
             <a:endParaRPr lang="en-US"/>
           </a:p>
@@ -8753,7 +8753,7 @@
           <a:p>
             <a:fld id="{699DC775-C286-4358-8C92-D7E584E969B3}" type="datetimeFigureOut">
               <a:rPr lang="en-US" smtClean="0"/>
-              <a:t>6/7/2016</a:t>
+              <a:t>9/6/2016</a:t>
             </a:fld>
             <a:endParaRPr lang="en-US"/>
           </a:p>
@@ -9279,7 +9279,7 @@
           <p:nvPr/>
         </p:nvSpPr>
         <p:spPr>
-          <a:xfrm rot="19181729">
+          <a:xfrm rot="19181730" flipH="1">
             <a:off x="82203" y="4502528"/>
             <a:ext cx="1770065" cy="559485"/>
           </a:xfrm>
@@ -9321,7 +9321,7 @@
           <p:nvPr/>
         </p:nvSpPr>
         <p:spPr>
-          <a:xfrm rot="19181729">
+          <a:xfrm rot="19181730" flipH="1">
             <a:off x="4141499" y="2632291"/>
             <a:ext cx="914400" cy="914400"/>
           </a:xfrm>
@@ -9361,7 +9361,7 @@
           <p:nvPr/>
         </p:nvSpPr>
         <p:spPr>
-          <a:xfrm rot="19181729">
+          <a:xfrm rot="19181730" flipH="1">
             <a:off x="6494974" y="3207384"/>
             <a:ext cx="1379725" cy="919817"/>
           </a:xfrm>
@@ -9414,7 +9414,7 @@
           <a:stretch/>
         </p:blipFill>
         <p:spPr bwMode="auto">
-          <a:xfrm rot="19181729">
+          <a:xfrm rot="19181730" flipH="1">
             <a:off x="7688855" y="460738"/>
             <a:ext cx="1022446" cy="1265171"/>
           </a:xfrm>
@@ -9472,7 +9472,7 @@
           <a:stretch/>
         </p:blipFill>
         <p:spPr bwMode="auto">
-          <a:xfrm rot="19181729">
+          <a:xfrm rot="19181730" flipH="1">
             <a:off x="2098698" y="4503515"/>
             <a:ext cx="1022446" cy="1265171"/>
           </a:xfrm>
@@ -9530,7 +9530,7 @@
           <a:stretch/>
         </p:blipFill>
         <p:spPr bwMode="auto">
-          <a:xfrm rot="19181729">
+          <a:xfrm rot="19181730" flipH="1">
             <a:off x="4706087" y="5170976"/>
             <a:ext cx="1409307" cy="1314450"/>
           </a:xfrm>
@@ -9577,7 +9577,7 @@
           <p:nvPr/>
         </p:nvSpPr>
         <p:spPr>
-          <a:xfrm rot="19181729">
+          <a:xfrm rot="19181730" flipH="1">
             <a:off x="2287533" y="1298507"/>
             <a:ext cx="914400" cy="914400"/>
           </a:xfrm>
@@ -9619,7 +9619,7 @@
           <p:nvPr/>
         </p:nvSpPr>
         <p:spPr>
-          <a:xfrm rot="19181729">
+          <a:xfrm rot="19181730" flipH="1">
             <a:off x="5398231" y="2470476"/>
             <a:ext cx="914400" cy="914400"/>
           </a:xfrm>
@@ -9661,7 +9661,7 @@
           <p:nvPr/>
         </p:nvSpPr>
         <p:spPr>
-          <a:xfrm rot="19181729">
+          <a:xfrm rot="19181730" flipH="1">
             <a:off x="3048588" y="3229197"/>
             <a:ext cx="914400" cy="914400"/>
           </a:xfrm>
@@ -9703,7 +9703,7 @@
           <p:nvPr/>
         </p:nvSpPr>
         <p:spPr>
-          <a:xfrm rot="19181729">
+          <a:xfrm rot="19181730" flipH="1">
             <a:off x="4419600" y="1143000"/>
             <a:ext cx="914400" cy="914400"/>
           </a:xfrm>
@@ -9745,7 +9745,7 @@
           <p:nvPr/>
         </p:nvSpPr>
         <p:spPr>
-          <a:xfrm rot="19181729">
+          <a:xfrm rot="19181730" flipH="1">
             <a:off x="5761560" y="4149447"/>
             <a:ext cx="914400" cy="914400"/>
           </a:xfrm>
@@ -9787,7 +9787,7 @@
           <p:nvPr/>
         </p:nvSpPr>
         <p:spPr>
-          <a:xfrm rot="19181729">
+          <a:xfrm rot="19181730" flipH="1">
             <a:off x="1426316" y="1611397"/>
             <a:ext cx="914400" cy="914400"/>
           </a:xfrm>
@@ -9829,7 +9829,7 @@
           <p:nvPr/>
         </p:nvSpPr>
         <p:spPr>
-          <a:xfrm rot="19181729">
+          <a:xfrm rot="19181730" flipH="1">
             <a:off x="3250688" y="4294249"/>
             <a:ext cx="914400" cy="914400"/>
           </a:xfrm>
@@ -9871,7 +9871,7 @@
           <p:nvPr/>
         </p:nvSpPr>
         <p:spPr>
-          <a:xfrm rot="19181729">
+          <a:xfrm rot="19181730" flipH="1">
             <a:off x="6158145" y="1191121"/>
             <a:ext cx="914400" cy="914400"/>
           </a:xfrm>
@@ -9917,7 +9917,7 @@
           <p:nvPr/>
         </p:nvSpPr>
         <p:spPr>
-          <a:xfrm rot="19181729">
+          <a:xfrm rot="19181730" flipH="1">
             <a:off x="7911696" y="2088684"/>
             <a:ext cx="914400" cy="914400"/>
           </a:xfrm>
@@ -9963,7 +9963,7 @@
           <p:nvPr/>
         </p:nvSpPr>
         <p:spPr>
-          <a:xfrm rot="19181729">
+          <a:xfrm rot="19181730" flipH="1">
             <a:off x="6608996" y="4908967"/>
             <a:ext cx="914400" cy="914400"/>
           </a:xfrm>
@@ -10005,7 +10005,7 @@
           <p:nvPr/>
         </p:nvSpPr>
         <p:spPr>
-          <a:xfrm rot="19181729">
+          <a:xfrm rot="19181730" flipH="1">
             <a:off x="7700146" y="5405628"/>
             <a:ext cx="914400" cy="914400"/>
           </a:xfrm>
@@ -10047,7 +10047,7 @@
           <p:nvPr/>
         </p:nvSpPr>
         <p:spPr>
-          <a:xfrm rot="19181729">
+          <a:xfrm rot="19181730" flipH="1">
             <a:off x="381000" y="2710958"/>
             <a:ext cx="914400" cy="914400"/>
           </a:xfrm>
@@ -10093,7 +10093,7 @@
           <p:nvPr/>
         </p:nvSpPr>
         <p:spPr>
-          <a:xfrm rot="19181729">
+          <a:xfrm rot="19181730" flipH="1">
             <a:off x="1796195" y="3011864"/>
             <a:ext cx="914400" cy="914400"/>
           </a:xfrm>
@@ -10139,7 +10139,7 @@
           <p:nvPr/>
         </p:nvSpPr>
         <p:spPr>
-          <a:xfrm rot="19181729">
+          <a:xfrm rot="19181730" flipH="1">
             <a:off x="4633674" y="3873964"/>
             <a:ext cx="914400" cy="914400"/>
           </a:xfrm>
@@ -10185,7 +10185,7 @@
           <p:nvPr/>
         </p:nvSpPr>
         <p:spPr>
-          <a:xfrm rot="19181729">
+          <a:xfrm rot="19181730" flipH="1">
             <a:off x="2573175" y="2332773"/>
             <a:ext cx="914400" cy="914400"/>
           </a:xfrm>
@@ -10231,7 +10231,7 @@
           <p:nvPr/>
         </p:nvSpPr>
         <p:spPr>
-          <a:xfrm rot="19181729">
+          <a:xfrm rot="19181730" flipH="1">
             <a:off x="4761689" y="358527"/>
             <a:ext cx="914400" cy="914400"/>
           </a:xfrm>
@@ -10315,7 +10315,7 @@
           <p:nvPr/>
         </p:nvSpPr>
         <p:spPr>
-          <a:xfrm rot="19181729">
+          <a:xfrm rot="19181730" flipH="1">
             <a:off x="6197963" y="181156"/>
             <a:ext cx="914400" cy="914400"/>
           </a:xfrm>
@@ -10357,7 +10357,7 @@
           <p:nvPr/>
         </p:nvSpPr>
         <p:spPr>
-          <a:xfrm rot="19181729">
+          <a:xfrm rot="19181730" flipH="1">
             <a:off x="2680347" y="264242"/>
             <a:ext cx="914400" cy="914400"/>
           </a:xfrm>
@@ -10403,7 +10403,7 @@
           <p:nvPr/>
         </p:nvSpPr>
         <p:spPr>
-          <a:xfrm rot="19181729">
+          <a:xfrm rot="19181730" flipH="1">
             <a:off x="1607300" y="202366"/>
             <a:ext cx="914400" cy="914400"/>
           </a:xfrm>
@@ -10445,7 +10445,7 @@
           <p:nvPr/>
         </p:nvSpPr>
         <p:spPr>
-          <a:xfrm rot="19181729">
+          <a:xfrm rot="19181730" flipH="1">
             <a:off x="381000" y="1627632"/>
             <a:ext cx="914400" cy="914400"/>
           </a:xfrm>
@@ -10487,7 +10487,7 @@
           <p:nvPr/>
         </p:nvSpPr>
         <p:spPr>
-          <a:xfrm rot="19181729">
+          <a:xfrm rot="19181730" flipH="1">
             <a:off x="3390274" y="1146016"/>
             <a:ext cx="914400" cy="914400"/>
           </a:xfrm>
@@ -10529,7 +10529,7 @@
           <p:nvPr/>
         </p:nvSpPr>
         <p:spPr>
-          <a:xfrm rot="19181729">
+          <a:xfrm rot="19181730" flipH="1">
             <a:off x="3183105" y="5700249"/>
             <a:ext cx="914400" cy="914400"/>
           </a:xfrm>
@@ -10571,7 +10571,7 @@
           <p:nvPr/>
         </p:nvSpPr>
         <p:spPr>
-          <a:xfrm rot="19181729">
+          <a:xfrm rot="19181730" flipH="1">
             <a:off x="927773" y="5700249"/>
             <a:ext cx="914400" cy="914400"/>
           </a:xfrm>
@@ -10613,7 +10613,7 @@
           <p:nvPr/>
         </p:nvSpPr>
         <p:spPr>
-          <a:xfrm rot="19181729">
+          <a:xfrm rot="19181730" flipH="1">
             <a:off x="7766297" y="3994567"/>
             <a:ext cx="914400" cy="914400"/>
           </a:xfrm>
@@ -10655,7 +10655,7 @@
           <p:nvPr/>
         </p:nvSpPr>
         <p:spPr>
-          <a:xfrm rot="19181729">
+          <a:xfrm rot="19181730" flipH="1">
             <a:off x="6694932" y="1894566"/>
             <a:ext cx="914400" cy="914400"/>
           </a:xfrm>
@@ -10699,7 +10699,7 @@
           <p:nvPr/>
         </p:nvSpPr>
         <p:spPr>
-          <a:xfrm rot="19181729">
+          <a:xfrm rot="19181730" flipH="1">
             <a:off x="566474" y="174258"/>
             <a:ext cx="914400" cy="914400"/>
           </a:xfrm>

</xml_diff>

<commit_message>
update the test case
</commit_message>
<xml_diff>
--- a/doc/test/PositionsLab/PositionsLabFlip.pptx
+++ b/doc/test/PositionsLab/PositionsLabFlip.pptx
@@ -15,7 +15,7 @@
     <p:sldId id="394" r:id="rId9"/>
     <p:sldId id="395" r:id="rId10"/>
     <p:sldId id="292" r:id="rId11"/>
-    <p:sldId id="396" r:id="rId12"/>
+    <p:sldId id="406" r:id="rId12"/>
     <p:sldId id="397" r:id="rId13"/>
     <p:sldId id="398" r:id="rId14"/>
     <p:sldId id="399" r:id="rId15"/>
@@ -142,7 +142,7 @@
             <p14:sldId id="394"/>
             <p14:sldId id="395"/>
             <p14:sldId id="292"/>
-            <p14:sldId id="396"/>
+            <p14:sldId id="406"/>
             <p14:sldId id="397"/>
             <p14:sldId id="398"/>
             <p14:sldId id="399"/>
@@ -344,7 +344,7 @@
           <a:p>
             <a:fld id="{699DC775-C286-4358-8C92-D7E584E969B3}" type="datetimeFigureOut">
               <a:rPr lang="en-US" smtClean="0"/>
-              <a:t>9/6/2016</a:t>
+              <a:t>9/7/2016</a:t>
             </a:fld>
             <a:endParaRPr lang="en-US"/>
           </a:p>
@@ -512,7 +512,7 @@
           <a:p>
             <a:fld id="{699DC775-C286-4358-8C92-D7E584E969B3}" type="datetimeFigureOut">
               <a:rPr lang="en-US" smtClean="0"/>
-              <a:t>9/6/2016</a:t>
+              <a:t>9/7/2016</a:t>
             </a:fld>
             <a:endParaRPr lang="en-US"/>
           </a:p>
@@ -690,7 +690,7 @@
           <a:p>
             <a:fld id="{699DC775-C286-4358-8C92-D7E584E969B3}" type="datetimeFigureOut">
               <a:rPr lang="en-US" smtClean="0"/>
-              <a:t>9/6/2016</a:t>
+              <a:t>9/7/2016</a:t>
             </a:fld>
             <a:endParaRPr lang="en-US"/>
           </a:p>
@@ -930,7 +930,7 @@
           <a:p>
             <a:fld id="{699DC775-C286-4358-8C92-D7E584E969B3}" type="datetimeFigureOut">
               <a:rPr lang="en-US" smtClean="0"/>
-              <a:t>9/6/2016</a:t>
+              <a:t>9/7/2016</a:t>
             </a:fld>
             <a:endParaRPr lang="en-US"/>
           </a:p>
@@ -1098,7 +1098,7 @@
           <a:p>
             <a:fld id="{699DC775-C286-4358-8C92-D7E584E969B3}" type="datetimeFigureOut">
               <a:rPr lang="en-US" smtClean="0"/>
-              <a:t>9/6/2016</a:t>
+              <a:t>9/7/2016</a:t>
             </a:fld>
             <a:endParaRPr lang="en-US"/>
           </a:p>
@@ -1343,7 +1343,7 @@
           <a:p>
             <a:fld id="{699DC775-C286-4358-8C92-D7E584E969B3}" type="datetimeFigureOut">
               <a:rPr lang="en-US" smtClean="0"/>
-              <a:t>9/6/2016</a:t>
+              <a:t>9/7/2016</a:t>
             </a:fld>
             <a:endParaRPr lang="en-US"/>
           </a:p>
@@ -1628,7 +1628,7 @@
           <a:p>
             <a:fld id="{699DC775-C286-4358-8C92-D7E584E969B3}" type="datetimeFigureOut">
               <a:rPr lang="en-US" smtClean="0"/>
-              <a:t>9/6/2016</a:t>
+              <a:t>9/7/2016</a:t>
             </a:fld>
             <a:endParaRPr lang="en-US"/>
           </a:p>
@@ -2047,7 +2047,7 @@
           <a:p>
             <a:fld id="{699DC775-C286-4358-8C92-D7E584E969B3}" type="datetimeFigureOut">
               <a:rPr lang="en-US" smtClean="0"/>
-              <a:t>9/6/2016</a:t>
+              <a:t>9/7/2016</a:t>
             </a:fld>
             <a:endParaRPr lang="en-US"/>
           </a:p>
@@ -2164,7 +2164,7 @@
           <a:p>
             <a:fld id="{699DC775-C286-4358-8C92-D7E584E969B3}" type="datetimeFigureOut">
               <a:rPr lang="en-US" smtClean="0"/>
-              <a:t>9/6/2016</a:t>
+              <a:t>9/7/2016</a:t>
             </a:fld>
             <a:endParaRPr lang="en-US"/>
           </a:p>
@@ -2259,7 +2259,7 @@
           <a:p>
             <a:fld id="{699DC775-C286-4358-8C92-D7E584E969B3}" type="datetimeFigureOut">
               <a:rPr lang="en-US" smtClean="0"/>
-              <a:t>9/6/2016</a:t>
+              <a:t>9/7/2016</a:t>
             </a:fld>
             <a:endParaRPr lang="en-US"/>
           </a:p>
@@ -2534,7 +2534,7 @@
           <a:p>
             <a:fld id="{699DC775-C286-4358-8C92-D7E584E969B3}" type="datetimeFigureOut">
               <a:rPr lang="en-US" smtClean="0"/>
-              <a:t>9/6/2016</a:t>
+              <a:t>9/7/2016</a:t>
             </a:fld>
             <a:endParaRPr lang="en-US"/>
           </a:p>
@@ -2702,7 +2702,7 @@
           <a:p>
             <a:fld id="{699DC775-C286-4358-8C92-D7E584E969B3}" type="datetimeFigureOut">
               <a:rPr lang="en-US" smtClean="0"/>
-              <a:t>9/6/2016</a:t>
+              <a:t>9/7/2016</a:t>
             </a:fld>
             <a:endParaRPr lang="en-US"/>
           </a:p>
@@ -2954,7 +2954,7 @@
           <a:p>
             <a:fld id="{699DC775-C286-4358-8C92-D7E584E969B3}" type="datetimeFigureOut">
               <a:rPr lang="en-US" smtClean="0"/>
-              <a:t>9/6/2016</a:t>
+              <a:t>9/7/2016</a:t>
             </a:fld>
             <a:endParaRPr lang="en-US"/>
           </a:p>
@@ -3122,7 +3122,7 @@
           <a:p>
             <a:fld id="{699DC775-C286-4358-8C92-D7E584E969B3}" type="datetimeFigureOut">
               <a:rPr lang="en-US" smtClean="0"/>
-              <a:t>9/6/2016</a:t>
+              <a:t>9/7/2016</a:t>
             </a:fld>
             <a:endParaRPr lang="en-US"/>
           </a:p>
@@ -3300,7 +3300,7 @@
           <a:p>
             <a:fld id="{699DC775-C286-4358-8C92-D7E584E969B3}" type="datetimeFigureOut">
               <a:rPr lang="en-US" smtClean="0"/>
-              <a:t>9/6/2016</a:t>
+              <a:t>9/7/2016</a:t>
             </a:fld>
             <a:endParaRPr lang="en-US"/>
           </a:p>
@@ -3548,7 +3548,7 @@
           <a:p>
             <a:fld id="{699DC775-C286-4358-8C92-D7E584E969B3}" type="datetimeFigureOut">
               <a:rPr lang="en-US" smtClean="0"/>
-              <a:t>9/6/2016</a:t>
+              <a:t>9/7/2016</a:t>
             </a:fld>
             <a:endParaRPr lang="en-US"/>
           </a:p>
@@ -3724,7 +3724,7 @@
           <a:p>
             <a:fld id="{699DC775-C286-4358-8C92-D7E584E969B3}" type="datetimeFigureOut">
               <a:rPr lang="en-US" smtClean="0"/>
-              <a:t>9/6/2016</a:t>
+              <a:t>9/7/2016</a:t>
             </a:fld>
             <a:endParaRPr lang="en-US"/>
           </a:p>
@@ -3977,7 +3977,7 @@
           <a:p>
             <a:fld id="{699DC775-C286-4358-8C92-D7E584E969B3}" type="datetimeFigureOut">
               <a:rPr lang="en-US" smtClean="0"/>
-              <a:t>9/6/2016</a:t>
+              <a:t>9/7/2016</a:t>
             </a:fld>
             <a:endParaRPr lang="en-US"/>
           </a:p>
@@ -4270,7 +4270,7 @@
           <a:p>
             <a:fld id="{699DC775-C286-4358-8C92-D7E584E969B3}" type="datetimeFigureOut">
               <a:rPr lang="en-US" smtClean="0"/>
-              <a:t>9/6/2016</a:t>
+              <a:t>9/7/2016</a:t>
             </a:fld>
             <a:endParaRPr lang="en-US"/>
           </a:p>
@@ -4697,7 +4697,7 @@
           <a:p>
             <a:fld id="{699DC775-C286-4358-8C92-D7E584E969B3}" type="datetimeFigureOut">
               <a:rPr lang="en-US" smtClean="0"/>
-              <a:t>9/6/2016</a:t>
+              <a:t>9/7/2016</a:t>
             </a:fld>
             <a:endParaRPr lang="en-US"/>
           </a:p>
@@ -4822,7 +4822,7 @@
           <a:p>
             <a:fld id="{699DC775-C286-4358-8C92-D7E584E969B3}" type="datetimeFigureOut">
               <a:rPr lang="en-US" smtClean="0"/>
-              <a:t>9/6/2016</a:t>
+              <a:t>9/7/2016</a:t>
             </a:fld>
             <a:endParaRPr lang="en-US"/>
           </a:p>
@@ -4925,7 +4925,7 @@
           <a:p>
             <a:fld id="{699DC775-C286-4358-8C92-D7E584E969B3}" type="datetimeFigureOut">
               <a:rPr lang="en-US" smtClean="0"/>
-              <a:t>9/6/2016</a:t>
+              <a:t>9/7/2016</a:t>
             </a:fld>
             <a:endParaRPr lang="en-US"/>
           </a:p>
@@ -5170,7 +5170,7 @@
           <a:p>
             <a:fld id="{699DC775-C286-4358-8C92-D7E584E969B3}" type="datetimeFigureOut">
               <a:rPr lang="en-US" smtClean="0"/>
-              <a:t>9/6/2016</a:t>
+              <a:t>9/7/2016</a:t>
             </a:fld>
             <a:endParaRPr lang="en-US"/>
           </a:p>
@@ -5453,7 +5453,7 @@
           <a:p>
             <a:fld id="{699DC775-C286-4358-8C92-D7E584E969B3}" type="datetimeFigureOut">
               <a:rPr lang="en-US" smtClean="0"/>
-              <a:t>9/6/2016</a:t>
+              <a:t>9/7/2016</a:t>
             </a:fld>
             <a:endParaRPr lang="en-US"/>
           </a:p>
@@ -5713,7 +5713,7 @@
           <a:p>
             <a:fld id="{699DC775-C286-4358-8C92-D7E584E969B3}" type="datetimeFigureOut">
               <a:rPr lang="en-US" smtClean="0"/>
-              <a:t>9/6/2016</a:t>
+              <a:t>9/7/2016</a:t>
             </a:fld>
             <a:endParaRPr lang="en-US"/>
           </a:p>
@@ -5889,7 +5889,7 @@
           <a:p>
             <a:fld id="{699DC775-C286-4358-8C92-D7E584E969B3}" type="datetimeFigureOut">
               <a:rPr lang="en-US" smtClean="0"/>
-              <a:t>9/6/2016</a:t>
+              <a:t>9/7/2016</a:t>
             </a:fld>
             <a:endParaRPr lang="en-US"/>
           </a:p>
@@ -6075,7 +6075,7 @@
           <a:p>
             <a:fld id="{699DC775-C286-4358-8C92-D7E584E969B3}" type="datetimeFigureOut">
               <a:rPr lang="en-US" smtClean="0"/>
-              <a:t>9/6/2016</a:t>
+              <a:t>9/7/2016</a:t>
             </a:fld>
             <a:endParaRPr lang="en-US"/>
           </a:p>
@@ -6360,7 +6360,7 @@
           <a:p>
             <a:fld id="{699DC775-C286-4358-8C92-D7E584E969B3}" type="datetimeFigureOut">
               <a:rPr lang="en-US" smtClean="0"/>
-              <a:t>9/6/2016</a:t>
+              <a:t>9/7/2016</a:t>
             </a:fld>
             <a:endParaRPr lang="en-US"/>
           </a:p>
@@ -6779,7 +6779,7 @@
           <a:p>
             <a:fld id="{699DC775-C286-4358-8C92-D7E584E969B3}" type="datetimeFigureOut">
               <a:rPr lang="en-US" smtClean="0"/>
-              <a:t>9/6/2016</a:t>
+              <a:t>9/7/2016</a:t>
             </a:fld>
             <a:endParaRPr lang="en-US"/>
           </a:p>
@@ -6896,7 +6896,7 @@
           <a:p>
             <a:fld id="{699DC775-C286-4358-8C92-D7E584E969B3}" type="datetimeFigureOut">
               <a:rPr lang="en-US" smtClean="0"/>
-              <a:t>9/6/2016</a:t>
+              <a:t>9/7/2016</a:t>
             </a:fld>
             <a:endParaRPr lang="en-US"/>
           </a:p>
@@ -6991,7 +6991,7 @@
           <a:p>
             <a:fld id="{699DC775-C286-4358-8C92-D7E584E969B3}" type="datetimeFigureOut">
               <a:rPr lang="en-US" smtClean="0"/>
-              <a:t>9/6/2016</a:t>
+              <a:t>9/7/2016</a:t>
             </a:fld>
             <a:endParaRPr lang="en-US"/>
           </a:p>
@@ -7266,7 +7266,7 @@
           <a:p>
             <a:fld id="{699DC775-C286-4358-8C92-D7E584E969B3}" type="datetimeFigureOut">
               <a:rPr lang="en-US" smtClean="0"/>
-              <a:t>9/6/2016</a:t>
+              <a:t>9/7/2016</a:t>
             </a:fld>
             <a:endParaRPr lang="en-US"/>
           </a:p>
@@ -7518,7 +7518,7 @@
           <a:p>
             <a:fld id="{699DC775-C286-4358-8C92-D7E584E969B3}" type="datetimeFigureOut">
               <a:rPr lang="en-US" smtClean="0"/>
-              <a:t>9/6/2016</a:t>
+              <a:t>9/7/2016</a:t>
             </a:fld>
             <a:endParaRPr lang="en-US"/>
           </a:p>
@@ -7729,7 +7729,7 @@
           <a:p>
             <a:fld id="{699DC775-C286-4358-8C92-D7E584E969B3}" type="datetimeFigureOut">
               <a:rPr lang="en-US" smtClean="0"/>
-              <a:t>9/6/2016</a:t>
+              <a:t>9/7/2016</a:t>
             </a:fld>
             <a:endParaRPr lang="en-US"/>
           </a:p>
@@ -8242,7 +8242,7 @@
           <a:p>
             <a:fld id="{699DC775-C286-4358-8C92-D7E584E969B3}" type="datetimeFigureOut">
               <a:rPr lang="en-US" smtClean="0"/>
-              <a:t>9/6/2016</a:t>
+              <a:t>9/7/2016</a:t>
             </a:fld>
             <a:endParaRPr lang="en-US"/>
           </a:p>
@@ -8753,7 +8753,7 @@
           <a:p>
             <a:fld id="{699DC775-C286-4358-8C92-D7E584E969B3}" type="datetimeFigureOut">
               <a:rPr lang="en-US" smtClean="0"/>
-              <a:t>9/6/2016</a:t>
+              <a:t>9/7/2016</a:t>
             </a:fld>
             <a:endParaRPr lang="en-US"/>
           </a:p>
@@ -23082,7 +23082,7 @@
       </p:grpSpPr>
       <p:sp>
         <p:nvSpPr>
-          <p:cNvPr id="4" name="Rectangle 3"/>
+          <p:cNvPr id="4" name="Rectangle 31"/>
           <p:cNvSpPr/>
           <p:nvPr/>
         </p:nvSpPr>
@@ -23122,7 +23122,7 @@
       </p:sp>
       <p:sp>
         <p:nvSpPr>
-          <p:cNvPr id="5" name="Oval 4"/>
+          <p:cNvPr id="5" name="Oval 41"/>
           <p:cNvSpPr>
             <a:spLocks/>
           </p:cNvSpPr>
@@ -23164,7 +23164,7 @@
       </p:sp>
       <p:sp>
         <p:nvSpPr>
-          <p:cNvPr id="7" name="Rectangle 6"/>
+          <p:cNvPr id="7" name="Rectangle 61"/>
           <p:cNvSpPr/>
           <p:nvPr/>
         </p:nvSpPr>
@@ -23204,7 +23204,7 @@
       </p:sp>
       <p:pic>
         <p:nvPicPr>
-          <p:cNvPr id="8" name="Picture 3"/>
+          <p:cNvPr id="8" name="Picture 31"/>
           <p:cNvPicPr>
             <a:picLocks noChangeAspect="1" noChangeArrowheads="1"/>
           </p:cNvPicPr>
@@ -23262,7 +23262,7 @@
       </p:pic>
       <p:pic>
         <p:nvPicPr>
-          <p:cNvPr id="9" name="Picture 4"/>
+          <p:cNvPr id="9" name="Picture 41"/>
           <p:cNvPicPr>
             <a:picLocks noChangeAspect="1" noChangeArrowheads="1"/>
           </p:cNvPicPr>
@@ -23320,7 +23320,7 @@
       </p:pic>
       <p:pic>
         <p:nvPicPr>
-          <p:cNvPr id="10" name="Picture 2"/>
+          <p:cNvPr id="10" name="Picture 21"/>
           <p:cNvPicPr>
             <a:picLocks noChangeAspect="1" noChangeArrowheads="1"/>
           </p:cNvPicPr>
@@ -23378,7 +23378,7 @@
       </p:pic>
       <p:sp>
         <p:nvSpPr>
-          <p:cNvPr id="3" name="Left Arrow 2"/>
+          <p:cNvPr id="3" name="Left Arrow 21"/>
           <p:cNvSpPr>
             <a:spLocks/>
           </p:cNvSpPr>
@@ -23420,7 +23420,7 @@
       </p:sp>
       <p:sp>
         <p:nvSpPr>
-          <p:cNvPr id="11" name="Up Arrow 10"/>
+          <p:cNvPr id="11" name="Up Arrow 101"/>
           <p:cNvSpPr>
             <a:spLocks/>
           </p:cNvSpPr>
@@ -23462,7 +23462,7 @@
       </p:sp>
       <p:sp>
         <p:nvSpPr>
-          <p:cNvPr id="12" name="Down Arrow 11"/>
+          <p:cNvPr id="12" name="Down Arrow 111"/>
           <p:cNvSpPr>
             <a:spLocks/>
           </p:cNvSpPr>
@@ -23504,7 +23504,7 @@
       </p:sp>
       <p:sp>
         <p:nvSpPr>
-          <p:cNvPr id="13" name="Left-Right Arrow 12"/>
+          <p:cNvPr id="13" name="Left-Right Arrow 121"/>
           <p:cNvSpPr>
             <a:spLocks/>
           </p:cNvSpPr>
@@ -23546,7 +23546,7 @@
       </p:sp>
       <p:sp>
         <p:nvSpPr>
-          <p:cNvPr id="14" name="Up-Down Arrow 13"/>
+          <p:cNvPr id="14" name="Up-Down Arrow 131"/>
           <p:cNvSpPr>
             <a:spLocks/>
           </p:cNvSpPr>
@@ -23588,7 +23588,7 @@
       </p:sp>
       <p:sp>
         <p:nvSpPr>
-          <p:cNvPr id="15" name="Quad Arrow 14"/>
+          <p:cNvPr id="15" name="Quad Arrow 141"/>
           <p:cNvSpPr>
             <a:spLocks/>
           </p:cNvSpPr>
@@ -23630,7 +23630,7 @@
       </p:sp>
       <p:sp>
         <p:nvSpPr>
-          <p:cNvPr id="16" name="Left-Right-Up Arrow 15"/>
+          <p:cNvPr id="16" name="Left-Right-Up Arrow 151"/>
           <p:cNvSpPr>
             <a:spLocks/>
           </p:cNvSpPr>
@@ -23672,7 +23672,7 @@
       </p:sp>
       <p:sp>
         <p:nvSpPr>
-          <p:cNvPr id="17" name="Bent Arrow 16"/>
+          <p:cNvPr id="17" name="Bent Arrow 161"/>
           <p:cNvSpPr>
             <a:spLocks/>
           </p:cNvSpPr>
@@ -23718,7 +23718,7 @@
       </p:sp>
       <p:sp>
         <p:nvSpPr>
-          <p:cNvPr id="18" name="U-Turn Arrow 17"/>
+          <p:cNvPr id="18" name="U-Turn Arrow 171"/>
           <p:cNvSpPr>
             <a:spLocks/>
           </p:cNvSpPr>
@@ -23764,7 +23764,7 @@
       </p:sp>
       <p:sp>
         <p:nvSpPr>
-          <p:cNvPr id="19" name="Left-Up Arrow 18"/>
+          <p:cNvPr id="19" name="Left-Up Arrow 181"/>
           <p:cNvSpPr>
             <a:spLocks/>
           </p:cNvSpPr>
@@ -23806,7 +23806,7 @@
       </p:sp>
       <p:sp>
         <p:nvSpPr>
-          <p:cNvPr id="20" name="Bent-Up Arrow 19"/>
+          <p:cNvPr id="20" name="Bent-Up Arrow 191"/>
           <p:cNvSpPr>
             <a:spLocks/>
           </p:cNvSpPr>
@@ -23848,7 +23848,7 @@
       </p:sp>
       <p:sp>
         <p:nvSpPr>
-          <p:cNvPr id="21" name="Curved Right Arrow 20"/>
+          <p:cNvPr id="21" name="Curved Right Arrow 201"/>
           <p:cNvSpPr>
             <a:spLocks/>
           </p:cNvSpPr>
@@ -23894,7 +23894,7 @@
       </p:sp>
       <p:sp>
         <p:nvSpPr>
-          <p:cNvPr id="22" name="Curved Left Arrow 21"/>
+          <p:cNvPr id="22" name="Curved Left Arrow 211"/>
           <p:cNvSpPr>
             <a:spLocks/>
           </p:cNvSpPr>
@@ -23940,7 +23940,7 @@
       </p:sp>
       <p:sp>
         <p:nvSpPr>
-          <p:cNvPr id="23" name="Curved Down Arrow 22"/>
+          <p:cNvPr id="23" name="Curved Down Arrow 221"/>
           <p:cNvSpPr>
             <a:spLocks/>
           </p:cNvSpPr>
@@ -23986,7 +23986,7 @@
       </p:sp>
       <p:sp>
         <p:nvSpPr>
-          <p:cNvPr id="24" name="Curved Up Arrow 23"/>
+          <p:cNvPr id="24" name="Curved Up Arrow 231"/>
           <p:cNvSpPr>
             <a:spLocks/>
           </p:cNvSpPr>
@@ -24032,7 +24032,7 @@
       </p:sp>
       <p:sp>
         <p:nvSpPr>
-          <p:cNvPr id="25" name="Striped Right Arrow 24"/>
+          <p:cNvPr id="25" name="Striped Right Arrow 241"/>
           <p:cNvSpPr>
             <a:spLocks/>
           </p:cNvSpPr>
@@ -24074,7 +24074,7 @@
       </p:sp>
       <p:sp>
         <p:nvSpPr>
-          <p:cNvPr id="26" name="Notched Right Arrow 25"/>
+          <p:cNvPr id="26" name="Notched Right Arrow 251"/>
           <p:cNvSpPr>
             <a:spLocks/>
           </p:cNvSpPr>
@@ -24116,7 +24116,7 @@
       </p:sp>
       <p:sp>
         <p:nvSpPr>
-          <p:cNvPr id="27" name="Pentagon 26"/>
+          <p:cNvPr id="27" name="Pentagon 261"/>
           <p:cNvSpPr>
             <a:spLocks/>
           </p:cNvSpPr>
@@ -24158,7 +24158,7 @@
       </p:sp>
       <p:sp>
         <p:nvSpPr>
-          <p:cNvPr id="28" name="Chevron 27"/>
+          <p:cNvPr id="28" name="Chevron 271"/>
           <p:cNvSpPr>
             <a:spLocks/>
           </p:cNvSpPr>
@@ -24204,7 +24204,7 @@
       </p:sp>
       <p:sp>
         <p:nvSpPr>
-          <p:cNvPr id="29" name="Right Arrow Callout 28"/>
+          <p:cNvPr id="29" name="Right Arrow Callout 281"/>
           <p:cNvSpPr>
             <a:spLocks/>
           </p:cNvSpPr>
@@ -24246,7 +24246,7 @@
       </p:sp>
       <p:sp>
         <p:nvSpPr>
-          <p:cNvPr id="30" name="Down Arrow Callout 29"/>
+          <p:cNvPr id="30" name="Down Arrow Callout 291"/>
           <p:cNvSpPr>
             <a:spLocks/>
           </p:cNvSpPr>
@@ -24288,7 +24288,7 @@
       </p:sp>
       <p:sp>
         <p:nvSpPr>
-          <p:cNvPr id="31" name="Left Arrow Callout 30"/>
+          <p:cNvPr id="31" name="Left Arrow Callout 301"/>
           <p:cNvSpPr>
             <a:spLocks/>
           </p:cNvSpPr>
@@ -24330,7 +24330,7 @@
       </p:sp>
       <p:sp>
         <p:nvSpPr>
-          <p:cNvPr id="32" name="Up Arrow Callout 31"/>
+          <p:cNvPr id="32" name="Up Arrow Callout 311"/>
           <p:cNvSpPr>
             <a:spLocks/>
           </p:cNvSpPr>
@@ -24372,7 +24372,7 @@
       </p:sp>
       <p:sp>
         <p:nvSpPr>
-          <p:cNvPr id="33" name="Left-Right Arrow Callout 32"/>
+          <p:cNvPr id="33" name="Left-Right Arrow Callout 321"/>
           <p:cNvSpPr>
             <a:spLocks/>
           </p:cNvSpPr>
@@ -24414,7 +24414,7 @@
       </p:sp>
       <p:sp>
         <p:nvSpPr>
-          <p:cNvPr id="34" name="Quad Arrow Callout 33"/>
+          <p:cNvPr id="34" name="Quad Arrow Callout 331"/>
           <p:cNvSpPr>
             <a:spLocks/>
           </p:cNvSpPr>
@@ -24456,7 +24456,7 @@
       </p:sp>
       <p:sp>
         <p:nvSpPr>
-          <p:cNvPr id="35" name="Circular Arrow 34"/>
+          <p:cNvPr id="35" name="Circular Arrow 341"/>
           <p:cNvSpPr>
             <a:spLocks/>
           </p:cNvSpPr>
@@ -24502,7 +24502,7 @@
       </p:sp>
       <p:sp>
         <p:nvSpPr>
-          <p:cNvPr id="37" name="Right Arrow 1"/>
+          <p:cNvPr id="37" name="Right Arrow 11"/>
           <p:cNvSpPr/>
           <p:nvPr/>
         </p:nvSpPr>
@@ -30612,7 +30612,7 @@
       </p:grpSpPr>
       <p:sp>
         <p:nvSpPr>
-          <p:cNvPr id="4" name="Rectangle 3"/>
+          <p:cNvPr id="4" name="Rectangle 31"/>
           <p:cNvSpPr/>
           <p:nvPr/>
         </p:nvSpPr>
@@ -30652,7 +30652,7 @@
       </p:sp>
       <p:sp>
         <p:nvSpPr>
-          <p:cNvPr id="5" name="Oval 4"/>
+          <p:cNvPr id="5" name="Oval 41"/>
           <p:cNvSpPr>
             <a:spLocks/>
           </p:cNvSpPr>
@@ -30694,7 +30694,7 @@
       </p:sp>
       <p:sp>
         <p:nvSpPr>
-          <p:cNvPr id="7" name="Rectangle 6"/>
+          <p:cNvPr id="7" name="Rectangle 61"/>
           <p:cNvSpPr/>
           <p:nvPr/>
         </p:nvSpPr>
@@ -30734,7 +30734,7 @@
       </p:sp>
       <p:pic>
         <p:nvPicPr>
-          <p:cNvPr id="8" name="Picture 3"/>
+          <p:cNvPr id="8" name="Picture 31"/>
           <p:cNvPicPr>
             <a:picLocks noChangeAspect="1" noChangeArrowheads="1"/>
           </p:cNvPicPr>
@@ -30792,7 +30792,7 @@
       </p:pic>
       <p:pic>
         <p:nvPicPr>
-          <p:cNvPr id="9" name="Picture 4"/>
+          <p:cNvPr id="9" name="Picture 41"/>
           <p:cNvPicPr>
             <a:picLocks noChangeAspect="1" noChangeArrowheads="1"/>
           </p:cNvPicPr>
@@ -30850,7 +30850,7 @@
       </p:pic>
       <p:pic>
         <p:nvPicPr>
-          <p:cNvPr id="10" name="Picture 2"/>
+          <p:cNvPr id="10" name="Picture 21"/>
           <p:cNvPicPr>
             <a:picLocks noChangeAspect="1" noChangeArrowheads="1"/>
           </p:cNvPicPr>
@@ -30908,7 +30908,7 @@
       </p:pic>
       <p:sp>
         <p:nvSpPr>
-          <p:cNvPr id="3" name="Left Arrow 2"/>
+          <p:cNvPr id="3" name="Left Arrow 21"/>
           <p:cNvSpPr>
             <a:spLocks/>
           </p:cNvSpPr>
@@ -30950,7 +30950,7 @@
       </p:sp>
       <p:sp>
         <p:nvSpPr>
-          <p:cNvPr id="11" name="Up Arrow 10"/>
+          <p:cNvPr id="11" name="Up Arrow 101"/>
           <p:cNvSpPr>
             <a:spLocks/>
           </p:cNvSpPr>
@@ -30992,7 +30992,7 @@
       </p:sp>
       <p:sp>
         <p:nvSpPr>
-          <p:cNvPr id="12" name="Down Arrow 11"/>
+          <p:cNvPr id="12" name="Down Arrow 111"/>
           <p:cNvSpPr>
             <a:spLocks/>
           </p:cNvSpPr>
@@ -31034,7 +31034,7 @@
       </p:sp>
       <p:sp>
         <p:nvSpPr>
-          <p:cNvPr id="13" name="Left-Right Arrow 12"/>
+          <p:cNvPr id="13" name="Left-Right Arrow 121"/>
           <p:cNvSpPr>
             <a:spLocks/>
           </p:cNvSpPr>
@@ -31076,7 +31076,7 @@
       </p:sp>
       <p:sp>
         <p:nvSpPr>
-          <p:cNvPr id="14" name="Up-Down Arrow 13"/>
+          <p:cNvPr id="14" name="Up-Down Arrow 131"/>
           <p:cNvSpPr>
             <a:spLocks/>
           </p:cNvSpPr>
@@ -31118,7 +31118,7 @@
       </p:sp>
       <p:sp>
         <p:nvSpPr>
-          <p:cNvPr id="15" name="Quad Arrow 14"/>
+          <p:cNvPr id="15" name="Quad Arrow 141"/>
           <p:cNvSpPr>
             <a:spLocks/>
           </p:cNvSpPr>
@@ -31160,7 +31160,7 @@
       </p:sp>
       <p:sp>
         <p:nvSpPr>
-          <p:cNvPr id="16" name="Left-Right-Up Arrow 15"/>
+          <p:cNvPr id="16" name="Left-Right-Up Arrow 151"/>
           <p:cNvSpPr>
             <a:spLocks/>
           </p:cNvSpPr>
@@ -31202,7 +31202,7 @@
       </p:sp>
       <p:sp>
         <p:nvSpPr>
-          <p:cNvPr id="17" name="Bent Arrow 16"/>
+          <p:cNvPr id="17" name="Bent Arrow 161"/>
           <p:cNvSpPr>
             <a:spLocks/>
           </p:cNvSpPr>
@@ -31248,7 +31248,7 @@
       </p:sp>
       <p:sp>
         <p:nvSpPr>
-          <p:cNvPr id="18" name="U-Turn Arrow 17"/>
+          <p:cNvPr id="18" name="U-Turn Arrow 171"/>
           <p:cNvSpPr>
             <a:spLocks/>
           </p:cNvSpPr>
@@ -31294,7 +31294,7 @@
       </p:sp>
       <p:sp>
         <p:nvSpPr>
-          <p:cNvPr id="19" name="Left-Up Arrow 18"/>
+          <p:cNvPr id="19" name="Left-Up Arrow 181"/>
           <p:cNvSpPr>
             <a:spLocks/>
           </p:cNvSpPr>
@@ -31336,7 +31336,7 @@
       </p:sp>
       <p:sp>
         <p:nvSpPr>
-          <p:cNvPr id="20" name="Bent-Up Arrow 19"/>
+          <p:cNvPr id="20" name="Bent-Up Arrow 191"/>
           <p:cNvSpPr>
             <a:spLocks/>
           </p:cNvSpPr>
@@ -31378,7 +31378,7 @@
       </p:sp>
       <p:sp>
         <p:nvSpPr>
-          <p:cNvPr id="21" name="Curved Right Arrow 20"/>
+          <p:cNvPr id="21" name="Curved Right Arrow 201"/>
           <p:cNvSpPr>
             <a:spLocks/>
           </p:cNvSpPr>
@@ -31424,7 +31424,7 @@
       </p:sp>
       <p:sp>
         <p:nvSpPr>
-          <p:cNvPr id="22" name="Curved Left Arrow 21"/>
+          <p:cNvPr id="22" name="Curved Left Arrow 211"/>
           <p:cNvSpPr>
             <a:spLocks/>
           </p:cNvSpPr>
@@ -31470,7 +31470,7 @@
       </p:sp>
       <p:sp>
         <p:nvSpPr>
-          <p:cNvPr id="23" name="Curved Down Arrow 22"/>
+          <p:cNvPr id="23" name="Curved Down Arrow 221"/>
           <p:cNvSpPr>
             <a:spLocks/>
           </p:cNvSpPr>
@@ -31516,7 +31516,7 @@
       </p:sp>
       <p:sp>
         <p:nvSpPr>
-          <p:cNvPr id="24" name="Curved Up Arrow 23"/>
+          <p:cNvPr id="24" name="Curved Up Arrow 231"/>
           <p:cNvSpPr>
             <a:spLocks/>
           </p:cNvSpPr>
@@ -31562,7 +31562,7 @@
       </p:sp>
       <p:sp>
         <p:nvSpPr>
-          <p:cNvPr id="25" name="Striped Right Arrow 24"/>
+          <p:cNvPr id="25" name="Striped Right Arrow 241"/>
           <p:cNvSpPr>
             <a:spLocks/>
           </p:cNvSpPr>
@@ -31604,7 +31604,7 @@
       </p:sp>
       <p:sp>
         <p:nvSpPr>
-          <p:cNvPr id="26" name="Notched Right Arrow 25"/>
+          <p:cNvPr id="26" name="Notched Right Arrow 251"/>
           <p:cNvSpPr>
             <a:spLocks/>
           </p:cNvSpPr>
@@ -31646,7 +31646,7 @@
       </p:sp>
       <p:sp>
         <p:nvSpPr>
-          <p:cNvPr id="27" name="Pentagon 26"/>
+          <p:cNvPr id="27" name="Pentagon 261"/>
           <p:cNvSpPr>
             <a:spLocks/>
           </p:cNvSpPr>
@@ -31688,7 +31688,7 @@
       </p:sp>
       <p:sp>
         <p:nvSpPr>
-          <p:cNvPr id="28" name="Chevron 27"/>
+          <p:cNvPr id="28" name="Chevron 271"/>
           <p:cNvSpPr>
             <a:spLocks/>
           </p:cNvSpPr>
@@ -31734,7 +31734,7 @@
       </p:sp>
       <p:sp>
         <p:nvSpPr>
-          <p:cNvPr id="29" name="Right Arrow Callout 28"/>
+          <p:cNvPr id="29" name="Right Arrow Callout 281"/>
           <p:cNvSpPr>
             <a:spLocks/>
           </p:cNvSpPr>
@@ -31776,7 +31776,7 @@
       </p:sp>
       <p:sp>
         <p:nvSpPr>
-          <p:cNvPr id="30" name="Down Arrow Callout 29"/>
+          <p:cNvPr id="30" name="Down Arrow Callout 291"/>
           <p:cNvSpPr>
             <a:spLocks/>
           </p:cNvSpPr>
@@ -31818,7 +31818,7 @@
       </p:sp>
       <p:sp>
         <p:nvSpPr>
-          <p:cNvPr id="31" name="Left Arrow Callout 30"/>
+          <p:cNvPr id="31" name="Left Arrow Callout 301"/>
           <p:cNvSpPr>
             <a:spLocks/>
           </p:cNvSpPr>
@@ -31860,7 +31860,7 @@
       </p:sp>
       <p:sp>
         <p:nvSpPr>
-          <p:cNvPr id="32" name="Up Arrow Callout 31"/>
+          <p:cNvPr id="32" name="Up Arrow Callout 311"/>
           <p:cNvSpPr>
             <a:spLocks/>
           </p:cNvSpPr>
@@ -31902,7 +31902,7 @@
       </p:sp>
       <p:sp>
         <p:nvSpPr>
-          <p:cNvPr id="33" name="Left-Right Arrow Callout 32"/>
+          <p:cNvPr id="33" name="Left-Right Arrow Callout 321"/>
           <p:cNvSpPr>
             <a:spLocks/>
           </p:cNvSpPr>
@@ -31944,7 +31944,7 @@
       </p:sp>
       <p:sp>
         <p:nvSpPr>
-          <p:cNvPr id="34" name="Quad Arrow Callout 33"/>
+          <p:cNvPr id="34" name="Quad Arrow Callout 331"/>
           <p:cNvSpPr>
             <a:spLocks/>
           </p:cNvSpPr>
@@ -31986,7 +31986,7 @@
       </p:sp>
       <p:sp>
         <p:nvSpPr>
-          <p:cNvPr id="35" name="Circular Arrow 34"/>
+          <p:cNvPr id="35" name="Circular Arrow 341"/>
           <p:cNvSpPr>
             <a:spLocks/>
           </p:cNvSpPr>
@@ -32032,7 +32032,7 @@
       </p:sp>
       <p:sp>
         <p:nvSpPr>
-          <p:cNvPr id="37" name="Right Arrow 1"/>
+          <p:cNvPr id="37" name="Right Arrow 11"/>
           <p:cNvSpPr/>
           <p:nvPr/>
         </p:nvSpPr>
@@ -32073,7 +32073,7 @@
     </p:spTree>
     <p:extLst>
       <p:ext uri="{BB962C8B-B14F-4D97-AF65-F5344CB8AC3E}">
-        <p14:creationId xmlns:p14="http://schemas.microsoft.com/office/powerpoint/2010/main" val="2477207831"/>
+        <p14:creationId xmlns:p14="http://schemas.microsoft.com/office/powerpoint/2010/main" val="747976516"/>
       </p:ext>
     </p:extLst>
   </p:cSld>

</xml_diff>